<commit_message>
Alteração do projeto de apresentação bola azul
</commit_message>
<xml_diff>
--- a/PastaDocumentosProjeto/KickOff.pptx
+++ b/PastaDocumentosProjeto/KickOff.pptx
@@ -129,7 +129,7 @@
           <p:cNvPr id="2" name="Title 1">
             <a:extLst>
               <a:ext uri="{FF2B5EF4-FFF2-40B4-BE49-F238E27FC236}">
-                <a16:creationId xmlns:a16="http://schemas.microsoft.com/office/drawing/2014/main" id="{77E9F20C-B952-4905-9ACE-D782886864D2}"/>
+                <a16:creationId xmlns:a16="http://schemas.microsoft.com/office/drawing/2014/main" id="{50CC348F-E9D0-44B7-B88A-F321713D88C6}"/>
               </a:ext>
             </a:extLst>
           </p:cNvPr>
@@ -166,7 +166,7 @@
           <p:cNvPr id="3" name="Subtitle 2">
             <a:extLst>
               <a:ext uri="{FF2B5EF4-FFF2-40B4-BE49-F238E27FC236}">
-                <a16:creationId xmlns:a16="http://schemas.microsoft.com/office/drawing/2014/main" id="{F0DE15BB-F4F3-4471-8DA0-EA9E3AAA2B8A}"/>
+                <a16:creationId xmlns:a16="http://schemas.microsoft.com/office/drawing/2014/main" id="{8D0E07EA-C424-404E-B25C-7963742E1E83}"/>
               </a:ext>
             </a:extLst>
           </p:cNvPr>
@@ -236,7 +236,7 @@
           <p:cNvPr id="4" name="Date Placeholder 3">
             <a:extLst>
               <a:ext uri="{FF2B5EF4-FFF2-40B4-BE49-F238E27FC236}">
-                <a16:creationId xmlns:a16="http://schemas.microsoft.com/office/drawing/2014/main" id="{1443FAC0-BC29-4F65-ADD8-E152EAE1B204}"/>
+                <a16:creationId xmlns:a16="http://schemas.microsoft.com/office/drawing/2014/main" id="{44B05EED-AD8B-4921-9976-85EBAF962C8A}"/>
               </a:ext>
             </a:extLst>
           </p:cNvPr>
@@ -252,7 +252,7 @@
           <a:bodyPr/>
           <a:lstStyle/>
           <a:p>
-            <a:fld id="{5E10563E-C2ED-45D1-B4AA-6A5E3DB10422}" type="datetimeFigureOut">
+            <a:fld id="{66BC6B83-723B-4A61-AF1D-11895469D1B2}" type="datetimeFigureOut">
               <a:rPr lang="en-US" smtClean="0"/>
               <a:t>3/18/2024</a:t>
             </a:fld>
@@ -265,7 +265,7 @@
           <p:cNvPr id="5" name="Footer Placeholder 4">
             <a:extLst>
               <a:ext uri="{FF2B5EF4-FFF2-40B4-BE49-F238E27FC236}">
-                <a16:creationId xmlns:a16="http://schemas.microsoft.com/office/drawing/2014/main" id="{710DF54B-DF86-4620-8214-BB60CC2AE83E}"/>
+                <a16:creationId xmlns:a16="http://schemas.microsoft.com/office/drawing/2014/main" id="{59460F73-AE60-4EC3-B233-32ABCD1FBA2B}"/>
               </a:ext>
             </a:extLst>
           </p:cNvPr>
@@ -290,7 +290,7 @@
           <p:cNvPr id="6" name="Slide Number Placeholder 5">
             <a:extLst>
               <a:ext uri="{FF2B5EF4-FFF2-40B4-BE49-F238E27FC236}">
-                <a16:creationId xmlns:a16="http://schemas.microsoft.com/office/drawing/2014/main" id="{1FA28447-0A1C-4383-A5A3-6FEF7A0D409A}"/>
+                <a16:creationId xmlns:a16="http://schemas.microsoft.com/office/drawing/2014/main" id="{9164FF3A-FA97-4BBF-A180-0C70F894EC34}"/>
               </a:ext>
             </a:extLst>
           </p:cNvPr>
@@ -306,7 +306,7 @@
           <a:bodyPr/>
           <a:lstStyle/>
           <a:p>
-            <a:fld id="{05F5F179-9695-4E37-BCBA-CCE21A878295}" type="slidenum">
+            <a:fld id="{F00C4CE6-1F53-4811-AB78-9A3AAF53B9BE}" type="slidenum">
               <a:rPr lang="en-US" smtClean="0"/>
               <a:t>‹#›</a:t>
             </a:fld>
@@ -317,7 +317,7 @@
     </p:spTree>
     <p:extLst>
       <p:ext uri="{BB962C8B-B14F-4D97-AF65-F5344CB8AC3E}">
-        <p14:creationId xmlns:p14="http://schemas.microsoft.com/office/powerpoint/2010/main" val="3832717694"/>
+        <p14:creationId xmlns:p14="http://schemas.microsoft.com/office/powerpoint/2010/main" val="2080028386"/>
       </p:ext>
     </p:extLst>
   </p:cSld>
@@ -349,7 +349,7 @@
           <p:cNvPr id="2" name="Title 1">
             <a:extLst>
               <a:ext uri="{FF2B5EF4-FFF2-40B4-BE49-F238E27FC236}">
-                <a16:creationId xmlns:a16="http://schemas.microsoft.com/office/drawing/2014/main" id="{E9696F08-82EC-4DA2-AFF2-837B9C165D05}"/>
+                <a16:creationId xmlns:a16="http://schemas.microsoft.com/office/drawing/2014/main" id="{ECCE2D1B-E9D7-4332-B2CB-6152C9000F2F}"/>
               </a:ext>
             </a:extLst>
           </p:cNvPr>
@@ -377,7 +377,7 @@
           <p:cNvPr id="3" name="Vertical Text Placeholder 2">
             <a:extLst>
               <a:ext uri="{FF2B5EF4-FFF2-40B4-BE49-F238E27FC236}">
-                <a16:creationId xmlns:a16="http://schemas.microsoft.com/office/drawing/2014/main" id="{F34021E2-7998-4033-A1FD-0B290D9DF56F}"/>
+                <a16:creationId xmlns:a16="http://schemas.microsoft.com/office/drawing/2014/main" id="{F3553147-F84F-4190-9162-FA7DC86CF80B}"/>
               </a:ext>
             </a:extLst>
           </p:cNvPr>
@@ -434,7 +434,7 @@
           <p:cNvPr id="4" name="Date Placeholder 3">
             <a:extLst>
               <a:ext uri="{FF2B5EF4-FFF2-40B4-BE49-F238E27FC236}">
-                <a16:creationId xmlns:a16="http://schemas.microsoft.com/office/drawing/2014/main" id="{F0C7B55F-DF90-4982-8A8C-C21B20DB9A3B}"/>
+                <a16:creationId xmlns:a16="http://schemas.microsoft.com/office/drawing/2014/main" id="{D6B29629-DE89-4829-92BC-9BC996796F5E}"/>
               </a:ext>
             </a:extLst>
           </p:cNvPr>
@@ -450,7 +450,7 @@
           <a:bodyPr/>
           <a:lstStyle/>
           <a:p>
-            <a:fld id="{5E10563E-C2ED-45D1-B4AA-6A5E3DB10422}" type="datetimeFigureOut">
+            <a:fld id="{66BC6B83-723B-4A61-AF1D-11895469D1B2}" type="datetimeFigureOut">
               <a:rPr lang="en-US" smtClean="0"/>
               <a:t>3/18/2024</a:t>
             </a:fld>
@@ -463,7 +463,7 @@
           <p:cNvPr id="5" name="Footer Placeholder 4">
             <a:extLst>
               <a:ext uri="{FF2B5EF4-FFF2-40B4-BE49-F238E27FC236}">
-                <a16:creationId xmlns:a16="http://schemas.microsoft.com/office/drawing/2014/main" id="{AA4A9590-3399-42F6-88FE-DC6A0297418F}"/>
+                <a16:creationId xmlns:a16="http://schemas.microsoft.com/office/drawing/2014/main" id="{1420A3F8-56C6-479D-84CA-3F63444DC4CE}"/>
               </a:ext>
             </a:extLst>
           </p:cNvPr>
@@ -488,7 +488,7 @@
           <p:cNvPr id="6" name="Slide Number Placeholder 5">
             <a:extLst>
               <a:ext uri="{FF2B5EF4-FFF2-40B4-BE49-F238E27FC236}">
-                <a16:creationId xmlns:a16="http://schemas.microsoft.com/office/drawing/2014/main" id="{76CF4AC1-42D0-49E9-9BB4-88EDCE0BF5DC}"/>
+                <a16:creationId xmlns:a16="http://schemas.microsoft.com/office/drawing/2014/main" id="{D054145F-A0EF-436D-925F-65472102C31C}"/>
               </a:ext>
             </a:extLst>
           </p:cNvPr>
@@ -504,7 +504,7 @@
           <a:bodyPr/>
           <a:lstStyle/>
           <a:p>
-            <a:fld id="{05F5F179-9695-4E37-BCBA-CCE21A878295}" type="slidenum">
+            <a:fld id="{F00C4CE6-1F53-4811-AB78-9A3AAF53B9BE}" type="slidenum">
               <a:rPr lang="en-US" smtClean="0"/>
               <a:t>‹#›</a:t>
             </a:fld>
@@ -515,7 +515,7 @@
     </p:spTree>
     <p:extLst>
       <p:ext uri="{BB962C8B-B14F-4D97-AF65-F5344CB8AC3E}">
-        <p14:creationId xmlns:p14="http://schemas.microsoft.com/office/powerpoint/2010/main" val="1059616425"/>
+        <p14:creationId xmlns:p14="http://schemas.microsoft.com/office/powerpoint/2010/main" val="1899404068"/>
       </p:ext>
     </p:extLst>
   </p:cSld>
@@ -547,7 +547,7 @@
           <p:cNvPr id="2" name="Vertical Title 1">
             <a:extLst>
               <a:ext uri="{FF2B5EF4-FFF2-40B4-BE49-F238E27FC236}">
-                <a16:creationId xmlns:a16="http://schemas.microsoft.com/office/drawing/2014/main" id="{C969C1A7-A93A-4A48-8F6A-B1E284EB63CA}"/>
+                <a16:creationId xmlns:a16="http://schemas.microsoft.com/office/drawing/2014/main" id="{801F3B6D-C049-4998-B942-3DC53FA05F74}"/>
               </a:ext>
             </a:extLst>
           </p:cNvPr>
@@ -580,7 +580,7 @@
           <p:cNvPr id="3" name="Vertical Text Placeholder 2">
             <a:extLst>
               <a:ext uri="{FF2B5EF4-FFF2-40B4-BE49-F238E27FC236}">
-                <a16:creationId xmlns:a16="http://schemas.microsoft.com/office/drawing/2014/main" id="{F6DE1CD0-E529-48C8-A5DF-2BC42D51AFCB}"/>
+                <a16:creationId xmlns:a16="http://schemas.microsoft.com/office/drawing/2014/main" id="{1DAFC0B5-DFB4-4E02-99CC-2E775D1ADA3A}"/>
               </a:ext>
             </a:extLst>
           </p:cNvPr>
@@ -642,7 +642,7 @@
           <p:cNvPr id="4" name="Date Placeholder 3">
             <a:extLst>
               <a:ext uri="{FF2B5EF4-FFF2-40B4-BE49-F238E27FC236}">
-                <a16:creationId xmlns:a16="http://schemas.microsoft.com/office/drawing/2014/main" id="{85564E8F-690B-4B49-8E6E-03BA6DF4BAAF}"/>
+                <a16:creationId xmlns:a16="http://schemas.microsoft.com/office/drawing/2014/main" id="{03CF83C7-9090-4C46-B6C6-235E48D3ABD5}"/>
               </a:ext>
             </a:extLst>
           </p:cNvPr>
@@ -658,7 +658,7 @@
           <a:bodyPr/>
           <a:lstStyle/>
           <a:p>
-            <a:fld id="{5E10563E-C2ED-45D1-B4AA-6A5E3DB10422}" type="datetimeFigureOut">
+            <a:fld id="{66BC6B83-723B-4A61-AF1D-11895469D1B2}" type="datetimeFigureOut">
               <a:rPr lang="en-US" smtClean="0"/>
               <a:t>3/18/2024</a:t>
             </a:fld>
@@ -671,7 +671,7 @@
           <p:cNvPr id="5" name="Footer Placeholder 4">
             <a:extLst>
               <a:ext uri="{FF2B5EF4-FFF2-40B4-BE49-F238E27FC236}">
-                <a16:creationId xmlns:a16="http://schemas.microsoft.com/office/drawing/2014/main" id="{E7C97F9F-5CD7-4FD9-8572-73CD882B2F92}"/>
+                <a16:creationId xmlns:a16="http://schemas.microsoft.com/office/drawing/2014/main" id="{F09FB8DF-3B7B-4646-9A12-21A01F1CE7BE}"/>
               </a:ext>
             </a:extLst>
           </p:cNvPr>
@@ -696,7 +696,7 @@
           <p:cNvPr id="6" name="Slide Number Placeholder 5">
             <a:extLst>
               <a:ext uri="{FF2B5EF4-FFF2-40B4-BE49-F238E27FC236}">
-                <a16:creationId xmlns:a16="http://schemas.microsoft.com/office/drawing/2014/main" id="{27326C9F-28BF-489C-9489-D187FD6F60B7}"/>
+                <a16:creationId xmlns:a16="http://schemas.microsoft.com/office/drawing/2014/main" id="{77E141A8-9955-4255-B8D4-89D23FC37B44}"/>
               </a:ext>
             </a:extLst>
           </p:cNvPr>
@@ -712,7 +712,7 @@
           <a:bodyPr/>
           <a:lstStyle/>
           <a:p>
-            <a:fld id="{05F5F179-9695-4E37-BCBA-CCE21A878295}" type="slidenum">
+            <a:fld id="{F00C4CE6-1F53-4811-AB78-9A3AAF53B9BE}" type="slidenum">
               <a:rPr lang="en-US" smtClean="0"/>
               <a:t>‹#›</a:t>
             </a:fld>
@@ -723,7 +723,7 @@
     </p:spTree>
     <p:extLst>
       <p:ext uri="{BB962C8B-B14F-4D97-AF65-F5344CB8AC3E}">
-        <p14:creationId xmlns:p14="http://schemas.microsoft.com/office/powerpoint/2010/main" val="4094759916"/>
+        <p14:creationId xmlns:p14="http://schemas.microsoft.com/office/powerpoint/2010/main" val="731308950"/>
       </p:ext>
     </p:extLst>
   </p:cSld>
@@ -755,7 +755,7 @@
           <p:cNvPr id="2" name="Title 1">
             <a:extLst>
               <a:ext uri="{FF2B5EF4-FFF2-40B4-BE49-F238E27FC236}">
-                <a16:creationId xmlns:a16="http://schemas.microsoft.com/office/drawing/2014/main" id="{D87BBADC-EC53-4114-84E6-1888B0D0325F}"/>
+                <a16:creationId xmlns:a16="http://schemas.microsoft.com/office/drawing/2014/main" id="{0BC372CD-0427-40FD-B2C2-3F2318776E59}"/>
               </a:ext>
             </a:extLst>
           </p:cNvPr>
@@ -783,7 +783,7 @@
           <p:cNvPr id="3" name="Content Placeholder 2">
             <a:extLst>
               <a:ext uri="{FF2B5EF4-FFF2-40B4-BE49-F238E27FC236}">
-                <a16:creationId xmlns:a16="http://schemas.microsoft.com/office/drawing/2014/main" id="{05FC23C9-0109-480C-A90E-E9430ABDCBBE}"/>
+                <a16:creationId xmlns:a16="http://schemas.microsoft.com/office/drawing/2014/main" id="{54BBA568-C110-436C-B735-4E583DE5A52F}"/>
               </a:ext>
             </a:extLst>
           </p:cNvPr>
@@ -840,7 +840,7 @@
           <p:cNvPr id="4" name="Date Placeholder 3">
             <a:extLst>
               <a:ext uri="{FF2B5EF4-FFF2-40B4-BE49-F238E27FC236}">
-                <a16:creationId xmlns:a16="http://schemas.microsoft.com/office/drawing/2014/main" id="{8E26134F-D87A-4284-B34A-D1ACBF15C557}"/>
+                <a16:creationId xmlns:a16="http://schemas.microsoft.com/office/drawing/2014/main" id="{CC394D46-F9F0-403E-952D-F55EA2D775A8}"/>
               </a:ext>
             </a:extLst>
           </p:cNvPr>
@@ -856,7 +856,7 @@
           <a:bodyPr/>
           <a:lstStyle/>
           <a:p>
-            <a:fld id="{5E10563E-C2ED-45D1-B4AA-6A5E3DB10422}" type="datetimeFigureOut">
+            <a:fld id="{66BC6B83-723B-4A61-AF1D-11895469D1B2}" type="datetimeFigureOut">
               <a:rPr lang="en-US" smtClean="0"/>
               <a:t>3/18/2024</a:t>
             </a:fld>
@@ -869,7 +869,7 @@
           <p:cNvPr id="5" name="Footer Placeholder 4">
             <a:extLst>
               <a:ext uri="{FF2B5EF4-FFF2-40B4-BE49-F238E27FC236}">
-                <a16:creationId xmlns:a16="http://schemas.microsoft.com/office/drawing/2014/main" id="{9A84DC47-213D-453F-8AE6-FD0A401D1141}"/>
+                <a16:creationId xmlns:a16="http://schemas.microsoft.com/office/drawing/2014/main" id="{55876986-6352-4F67-B5A7-D23B3ECAB613}"/>
               </a:ext>
             </a:extLst>
           </p:cNvPr>
@@ -894,7 +894,7 @@
           <p:cNvPr id="6" name="Slide Number Placeholder 5">
             <a:extLst>
               <a:ext uri="{FF2B5EF4-FFF2-40B4-BE49-F238E27FC236}">
-                <a16:creationId xmlns:a16="http://schemas.microsoft.com/office/drawing/2014/main" id="{6A1FDFD3-4DF2-4B91-825F-35DE811C09CB}"/>
+                <a16:creationId xmlns:a16="http://schemas.microsoft.com/office/drawing/2014/main" id="{BDEA2259-C5A5-409E-8CF8-F6479157F009}"/>
               </a:ext>
             </a:extLst>
           </p:cNvPr>
@@ -910,7 +910,7 @@
           <a:bodyPr/>
           <a:lstStyle/>
           <a:p>
-            <a:fld id="{05F5F179-9695-4E37-BCBA-CCE21A878295}" type="slidenum">
+            <a:fld id="{F00C4CE6-1F53-4811-AB78-9A3AAF53B9BE}" type="slidenum">
               <a:rPr lang="en-US" smtClean="0"/>
               <a:t>‹#›</a:t>
             </a:fld>
@@ -921,7 +921,7 @@
     </p:spTree>
     <p:extLst>
       <p:ext uri="{BB962C8B-B14F-4D97-AF65-F5344CB8AC3E}">
-        <p14:creationId xmlns:p14="http://schemas.microsoft.com/office/powerpoint/2010/main" val="3492016225"/>
+        <p14:creationId xmlns:p14="http://schemas.microsoft.com/office/powerpoint/2010/main" val="1753638253"/>
       </p:ext>
     </p:extLst>
   </p:cSld>
@@ -953,7 +953,7 @@
           <p:cNvPr id="2" name="Title 1">
             <a:extLst>
               <a:ext uri="{FF2B5EF4-FFF2-40B4-BE49-F238E27FC236}">
-                <a16:creationId xmlns:a16="http://schemas.microsoft.com/office/drawing/2014/main" id="{EBDDAA1F-16E2-4AC1-AA25-A4EEAA9D630F}"/>
+                <a16:creationId xmlns:a16="http://schemas.microsoft.com/office/drawing/2014/main" id="{C8F3DDD0-7BD1-49E4-AA22-6DC69737800E}"/>
               </a:ext>
             </a:extLst>
           </p:cNvPr>
@@ -990,7 +990,7 @@
           <p:cNvPr id="3" name="Text Placeholder 2">
             <a:extLst>
               <a:ext uri="{FF2B5EF4-FFF2-40B4-BE49-F238E27FC236}">
-                <a16:creationId xmlns:a16="http://schemas.microsoft.com/office/drawing/2014/main" id="{A16826D5-7CCF-4FF4-B942-578C30209122}"/>
+                <a16:creationId xmlns:a16="http://schemas.microsoft.com/office/drawing/2014/main" id="{3EDDC7C5-CC82-4726-9FB8-410A1BF1824D}"/>
               </a:ext>
             </a:extLst>
           </p:cNvPr>
@@ -1115,7 +1115,7 @@
           <p:cNvPr id="4" name="Date Placeholder 3">
             <a:extLst>
               <a:ext uri="{FF2B5EF4-FFF2-40B4-BE49-F238E27FC236}">
-                <a16:creationId xmlns:a16="http://schemas.microsoft.com/office/drawing/2014/main" id="{378A79D8-6C62-4B2B-BB7B-588B2E425DEB}"/>
+                <a16:creationId xmlns:a16="http://schemas.microsoft.com/office/drawing/2014/main" id="{18D66B5B-29E3-4CC3-A881-F0F2A0335F22}"/>
               </a:ext>
             </a:extLst>
           </p:cNvPr>
@@ -1131,7 +1131,7 @@
           <a:bodyPr/>
           <a:lstStyle/>
           <a:p>
-            <a:fld id="{5E10563E-C2ED-45D1-B4AA-6A5E3DB10422}" type="datetimeFigureOut">
+            <a:fld id="{66BC6B83-723B-4A61-AF1D-11895469D1B2}" type="datetimeFigureOut">
               <a:rPr lang="en-US" smtClean="0"/>
               <a:t>3/18/2024</a:t>
             </a:fld>
@@ -1144,7 +1144,7 @@
           <p:cNvPr id="5" name="Footer Placeholder 4">
             <a:extLst>
               <a:ext uri="{FF2B5EF4-FFF2-40B4-BE49-F238E27FC236}">
-                <a16:creationId xmlns:a16="http://schemas.microsoft.com/office/drawing/2014/main" id="{EDE464F5-E695-4653-865D-41B3E56CFD51}"/>
+                <a16:creationId xmlns:a16="http://schemas.microsoft.com/office/drawing/2014/main" id="{0716B822-6E65-475E-B925-3B751A91C266}"/>
               </a:ext>
             </a:extLst>
           </p:cNvPr>
@@ -1169,7 +1169,7 @@
           <p:cNvPr id="6" name="Slide Number Placeholder 5">
             <a:extLst>
               <a:ext uri="{FF2B5EF4-FFF2-40B4-BE49-F238E27FC236}">
-                <a16:creationId xmlns:a16="http://schemas.microsoft.com/office/drawing/2014/main" id="{D4D74246-F1C1-444B-B5AE-52D9D3497014}"/>
+                <a16:creationId xmlns:a16="http://schemas.microsoft.com/office/drawing/2014/main" id="{C24B6033-13AD-4A67-9F33-1E158A4732B5}"/>
               </a:ext>
             </a:extLst>
           </p:cNvPr>
@@ -1185,7 +1185,7 @@
           <a:bodyPr/>
           <a:lstStyle/>
           <a:p>
-            <a:fld id="{05F5F179-9695-4E37-BCBA-CCE21A878295}" type="slidenum">
+            <a:fld id="{F00C4CE6-1F53-4811-AB78-9A3AAF53B9BE}" type="slidenum">
               <a:rPr lang="en-US" smtClean="0"/>
               <a:t>‹#›</a:t>
             </a:fld>
@@ -1196,7 +1196,7 @@
     </p:spTree>
     <p:extLst>
       <p:ext uri="{BB962C8B-B14F-4D97-AF65-F5344CB8AC3E}">
-        <p14:creationId xmlns:p14="http://schemas.microsoft.com/office/powerpoint/2010/main" val="3886044501"/>
+        <p14:creationId xmlns:p14="http://schemas.microsoft.com/office/powerpoint/2010/main" val="3864849458"/>
       </p:ext>
     </p:extLst>
   </p:cSld>
@@ -1228,7 +1228,7 @@
           <p:cNvPr id="2" name="Title 1">
             <a:extLst>
               <a:ext uri="{FF2B5EF4-FFF2-40B4-BE49-F238E27FC236}">
-                <a16:creationId xmlns:a16="http://schemas.microsoft.com/office/drawing/2014/main" id="{736A5B65-6A66-406F-B3A3-873366097B9E}"/>
+                <a16:creationId xmlns:a16="http://schemas.microsoft.com/office/drawing/2014/main" id="{55823AC4-2AA6-4FB2-B2A3-0C13CBA9E0B0}"/>
               </a:ext>
             </a:extLst>
           </p:cNvPr>
@@ -1256,7 +1256,7 @@
           <p:cNvPr id="3" name="Content Placeholder 2">
             <a:extLst>
               <a:ext uri="{FF2B5EF4-FFF2-40B4-BE49-F238E27FC236}">
-                <a16:creationId xmlns:a16="http://schemas.microsoft.com/office/drawing/2014/main" id="{FD38DB77-B5ED-4245-B37D-C73427CC0A6A}"/>
+                <a16:creationId xmlns:a16="http://schemas.microsoft.com/office/drawing/2014/main" id="{1A145117-7672-4C36-AD74-868F84A103F3}"/>
               </a:ext>
             </a:extLst>
           </p:cNvPr>
@@ -1318,7 +1318,7 @@
           <p:cNvPr id="4" name="Content Placeholder 3">
             <a:extLst>
               <a:ext uri="{FF2B5EF4-FFF2-40B4-BE49-F238E27FC236}">
-                <a16:creationId xmlns:a16="http://schemas.microsoft.com/office/drawing/2014/main" id="{A83F4B08-B0E5-4556-A530-C757C5BD9694}"/>
+                <a16:creationId xmlns:a16="http://schemas.microsoft.com/office/drawing/2014/main" id="{2D4E6C89-752A-4A14-BB48-AD2EAA825CE0}"/>
               </a:ext>
             </a:extLst>
           </p:cNvPr>
@@ -1380,7 +1380,7 @@
           <p:cNvPr id="5" name="Date Placeholder 4">
             <a:extLst>
               <a:ext uri="{FF2B5EF4-FFF2-40B4-BE49-F238E27FC236}">
-                <a16:creationId xmlns:a16="http://schemas.microsoft.com/office/drawing/2014/main" id="{A66DFE03-3249-4900-95F1-5C6C33C8BE6E}"/>
+                <a16:creationId xmlns:a16="http://schemas.microsoft.com/office/drawing/2014/main" id="{3F87B9B7-3976-4F68-9DBC-C9C940676F59}"/>
               </a:ext>
             </a:extLst>
           </p:cNvPr>
@@ -1396,7 +1396,7 @@
           <a:bodyPr/>
           <a:lstStyle/>
           <a:p>
-            <a:fld id="{5E10563E-C2ED-45D1-B4AA-6A5E3DB10422}" type="datetimeFigureOut">
+            <a:fld id="{66BC6B83-723B-4A61-AF1D-11895469D1B2}" type="datetimeFigureOut">
               <a:rPr lang="en-US" smtClean="0"/>
               <a:t>3/18/2024</a:t>
             </a:fld>
@@ -1409,7 +1409,7 @@
           <p:cNvPr id="6" name="Footer Placeholder 5">
             <a:extLst>
               <a:ext uri="{FF2B5EF4-FFF2-40B4-BE49-F238E27FC236}">
-                <a16:creationId xmlns:a16="http://schemas.microsoft.com/office/drawing/2014/main" id="{25F11E36-ECC5-4870-94A7-094722564C7F}"/>
+                <a16:creationId xmlns:a16="http://schemas.microsoft.com/office/drawing/2014/main" id="{801DE316-3350-44BC-883F-BD0DCC5CEBD2}"/>
               </a:ext>
             </a:extLst>
           </p:cNvPr>
@@ -1434,7 +1434,7 @@
           <p:cNvPr id="7" name="Slide Number Placeholder 6">
             <a:extLst>
               <a:ext uri="{FF2B5EF4-FFF2-40B4-BE49-F238E27FC236}">
-                <a16:creationId xmlns:a16="http://schemas.microsoft.com/office/drawing/2014/main" id="{E40F3626-D817-4765-B475-4F13BFAC8D85}"/>
+                <a16:creationId xmlns:a16="http://schemas.microsoft.com/office/drawing/2014/main" id="{382E4D30-0F5E-442D-96EC-D080D9960D75}"/>
               </a:ext>
             </a:extLst>
           </p:cNvPr>
@@ -1450,7 +1450,7 @@
           <a:bodyPr/>
           <a:lstStyle/>
           <a:p>
-            <a:fld id="{05F5F179-9695-4E37-BCBA-CCE21A878295}" type="slidenum">
+            <a:fld id="{F00C4CE6-1F53-4811-AB78-9A3AAF53B9BE}" type="slidenum">
               <a:rPr lang="en-US" smtClean="0"/>
               <a:t>‹#›</a:t>
             </a:fld>
@@ -1461,7 +1461,7 @@
     </p:spTree>
     <p:extLst>
       <p:ext uri="{BB962C8B-B14F-4D97-AF65-F5344CB8AC3E}">
-        <p14:creationId xmlns:p14="http://schemas.microsoft.com/office/powerpoint/2010/main" val="2832842210"/>
+        <p14:creationId xmlns:p14="http://schemas.microsoft.com/office/powerpoint/2010/main" val="3727605974"/>
       </p:ext>
     </p:extLst>
   </p:cSld>
@@ -1493,7 +1493,7 @@
           <p:cNvPr id="2" name="Title 1">
             <a:extLst>
               <a:ext uri="{FF2B5EF4-FFF2-40B4-BE49-F238E27FC236}">
-                <a16:creationId xmlns:a16="http://schemas.microsoft.com/office/drawing/2014/main" id="{4F2A6CC2-F613-4D1B-AE47-FB61EFFBB0C9}"/>
+                <a16:creationId xmlns:a16="http://schemas.microsoft.com/office/drawing/2014/main" id="{2BE59D04-AEA4-4A7B-AD3D-D8561E72C6E1}"/>
               </a:ext>
             </a:extLst>
           </p:cNvPr>
@@ -1526,7 +1526,7 @@
           <p:cNvPr id="3" name="Text Placeholder 2">
             <a:extLst>
               <a:ext uri="{FF2B5EF4-FFF2-40B4-BE49-F238E27FC236}">
-                <a16:creationId xmlns:a16="http://schemas.microsoft.com/office/drawing/2014/main" id="{94ECCF80-0D76-4560-A99B-4B27D09274A6}"/>
+                <a16:creationId xmlns:a16="http://schemas.microsoft.com/office/drawing/2014/main" id="{94174719-925F-4A3C-8F1F-EFACF6CF7D2E}"/>
               </a:ext>
             </a:extLst>
           </p:cNvPr>
@@ -1597,7 +1597,7 @@
           <p:cNvPr id="4" name="Content Placeholder 3">
             <a:extLst>
               <a:ext uri="{FF2B5EF4-FFF2-40B4-BE49-F238E27FC236}">
-                <a16:creationId xmlns:a16="http://schemas.microsoft.com/office/drawing/2014/main" id="{7DA9FC71-E06E-4F02-B918-4599ACCAA390}"/>
+                <a16:creationId xmlns:a16="http://schemas.microsoft.com/office/drawing/2014/main" id="{AE084E79-2DF4-4802-A2C2-9E61CF0E010E}"/>
               </a:ext>
             </a:extLst>
           </p:cNvPr>
@@ -1659,7 +1659,7 @@
           <p:cNvPr id="5" name="Text Placeholder 4">
             <a:extLst>
               <a:ext uri="{FF2B5EF4-FFF2-40B4-BE49-F238E27FC236}">
-                <a16:creationId xmlns:a16="http://schemas.microsoft.com/office/drawing/2014/main" id="{6FC6A6A3-BC77-45AE-9DC7-AEF1A7855B56}"/>
+                <a16:creationId xmlns:a16="http://schemas.microsoft.com/office/drawing/2014/main" id="{8051CAC7-0BD8-4C74-A239-8A60A580B61B}"/>
               </a:ext>
             </a:extLst>
           </p:cNvPr>
@@ -1730,7 +1730,7 @@
           <p:cNvPr id="6" name="Content Placeholder 5">
             <a:extLst>
               <a:ext uri="{FF2B5EF4-FFF2-40B4-BE49-F238E27FC236}">
-                <a16:creationId xmlns:a16="http://schemas.microsoft.com/office/drawing/2014/main" id="{25D27848-901B-4096-ABF7-BA1F45B8DD6E}"/>
+                <a16:creationId xmlns:a16="http://schemas.microsoft.com/office/drawing/2014/main" id="{F768FA29-4CCC-4FB3-B0A7-34A3632A9767}"/>
               </a:ext>
             </a:extLst>
           </p:cNvPr>
@@ -1792,7 +1792,7 @@
           <p:cNvPr id="7" name="Date Placeholder 6">
             <a:extLst>
               <a:ext uri="{FF2B5EF4-FFF2-40B4-BE49-F238E27FC236}">
-                <a16:creationId xmlns:a16="http://schemas.microsoft.com/office/drawing/2014/main" id="{D0295410-9607-43C3-9260-57905D28A3DB}"/>
+                <a16:creationId xmlns:a16="http://schemas.microsoft.com/office/drawing/2014/main" id="{79463221-F08D-40F6-91A7-C9132956612B}"/>
               </a:ext>
             </a:extLst>
           </p:cNvPr>
@@ -1808,7 +1808,7 @@
           <a:bodyPr/>
           <a:lstStyle/>
           <a:p>
-            <a:fld id="{5E10563E-C2ED-45D1-B4AA-6A5E3DB10422}" type="datetimeFigureOut">
+            <a:fld id="{66BC6B83-723B-4A61-AF1D-11895469D1B2}" type="datetimeFigureOut">
               <a:rPr lang="en-US" smtClean="0"/>
               <a:t>3/18/2024</a:t>
             </a:fld>
@@ -1821,7 +1821,7 @@
           <p:cNvPr id="8" name="Footer Placeholder 7">
             <a:extLst>
               <a:ext uri="{FF2B5EF4-FFF2-40B4-BE49-F238E27FC236}">
-                <a16:creationId xmlns:a16="http://schemas.microsoft.com/office/drawing/2014/main" id="{E1A153C3-541E-4727-A1B6-5512B8E34B7B}"/>
+                <a16:creationId xmlns:a16="http://schemas.microsoft.com/office/drawing/2014/main" id="{3D6E9B44-5D4B-40B9-8D04-41DBEC632180}"/>
               </a:ext>
             </a:extLst>
           </p:cNvPr>
@@ -1846,7 +1846,7 @@
           <p:cNvPr id="9" name="Slide Number Placeholder 8">
             <a:extLst>
               <a:ext uri="{FF2B5EF4-FFF2-40B4-BE49-F238E27FC236}">
-                <a16:creationId xmlns:a16="http://schemas.microsoft.com/office/drawing/2014/main" id="{18EDBDE7-6C90-4E3F-B66A-444C52B9BD91}"/>
+                <a16:creationId xmlns:a16="http://schemas.microsoft.com/office/drawing/2014/main" id="{CEA0ABB6-5036-4FF3-B667-186AF4A9F7AB}"/>
               </a:ext>
             </a:extLst>
           </p:cNvPr>
@@ -1862,7 +1862,7 @@
           <a:bodyPr/>
           <a:lstStyle/>
           <a:p>
-            <a:fld id="{05F5F179-9695-4E37-BCBA-CCE21A878295}" type="slidenum">
+            <a:fld id="{F00C4CE6-1F53-4811-AB78-9A3AAF53B9BE}" type="slidenum">
               <a:rPr lang="en-US" smtClean="0"/>
               <a:t>‹#›</a:t>
             </a:fld>
@@ -1873,7 +1873,7 @@
     </p:spTree>
     <p:extLst>
       <p:ext uri="{BB962C8B-B14F-4D97-AF65-F5344CB8AC3E}">
-        <p14:creationId xmlns:p14="http://schemas.microsoft.com/office/powerpoint/2010/main" val="2441594177"/>
+        <p14:creationId xmlns:p14="http://schemas.microsoft.com/office/powerpoint/2010/main" val="2192807543"/>
       </p:ext>
     </p:extLst>
   </p:cSld>
@@ -1905,7 +1905,7 @@
           <p:cNvPr id="2" name="Title 1">
             <a:extLst>
               <a:ext uri="{FF2B5EF4-FFF2-40B4-BE49-F238E27FC236}">
-                <a16:creationId xmlns:a16="http://schemas.microsoft.com/office/drawing/2014/main" id="{A517DFE5-61B8-4466-9A0B-7CDE240CC5F1}"/>
+                <a16:creationId xmlns:a16="http://schemas.microsoft.com/office/drawing/2014/main" id="{BD730F4C-FE9B-4DF6-8004-117EAF36482A}"/>
               </a:ext>
             </a:extLst>
           </p:cNvPr>
@@ -1933,7 +1933,7 @@
           <p:cNvPr id="3" name="Date Placeholder 2">
             <a:extLst>
               <a:ext uri="{FF2B5EF4-FFF2-40B4-BE49-F238E27FC236}">
-                <a16:creationId xmlns:a16="http://schemas.microsoft.com/office/drawing/2014/main" id="{A5B78E99-6885-4D42-B4CC-8D494CB95238}"/>
+                <a16:creationId xmlns:a16="http://schemas.microsoft.com/office/drawing/2014/main" id="{B37F73D8-E01B-4E1F-921F-6DFDD2548E4B}"/>
               </a:ext>
             </a:extLst>
           </p:cNvPr>
@@ -1949,7 +1949,7 @@
           <a:bodyPr/>
           <a:lstStyle/>
           <a:p>
-            <a:fld id="{5E10563E-C2ED-45D1-B4AA-6A5E3DB10422}" type="datetimeFigureOut">
+            <a:fld id="{66BC6B83-723B-4A61-AF1D-11895469D1B2}" type="datetimeFigureOut">
               <a:rPr lang="en-US" smtClean="0"/>
               <a:t>3/18/2024</a:t>
             </a:fld>
@@ -1962,7 +1962,7 @@
           <p:cNvPr id="4" name="Footer Placeholder 3">
             <a:extLst>
               <a:ext uri="{FF2B5EF4-FFF2-40B4-BE49-F238E27FC236}">
-                <a16:creationId xmlns:a16="http://schemas.microsoft.com/office/drawing/2014/main" id="{C0BACE5C-D3E7-44ED-B921-6FD20A5AFFC7}"/>
+                <a16:creationId xmlns:a16="http://schemas.microsoft.com/office/drawing/2014/main" id="{4A101172-053B-4686-86D5-783C5E25830D}"/>
               </a:ext>
             </a:extLst>
           </p:cNvPr>
@@ -1987,7 +1987,7 @@
           <p:cNvPr id="5" name="Slide Number Placeholder 4">
             <a:extLst>
               <a:ext uri="{FF2B5EF4-FFF2-40B4-BE49-F238E27FC236}">
-                <a16:creationId xmlns:a16="http://schemas.microsoft.com/office/drawing/2014/main" id="{B3F098EC-E197-4152-B3DD-ECF6AEC04EFE}"/>
+                <a16:creationId xmlns:a16="http://schemas.microsoft.com/office/drawing/2014/main" id="{1CA9BDC6-002A-4867-83BD-EAE3F06097C3}"/>
               </a:ext>
             </a:extLst>
           </p:cNvPr>
@@ -2003,7 +2003,7 @@
           <a:bodyPr/>
           <a:lstStyle/>
           <a:p>
-            <a:fld id="{05F5F179-9695-4E37-BCBA-CCE21A878295}" type="slidenum">
+            <a:fld id="{F00C4CE6-1F53-4811-AB78-9A3AAF53B9BE}" type="slidenum">
               <a:rPr lang="en-US" smtClean="0"/>
               <a:t>‹#›</a:t>
             </a:fld>
@@ -2014,7 +2014,7 @@
     </p:spTree>
     <p:extLst>
       <p:ext uri="{BB962C8B-B14F-4D97-AF65-F5344CB8AC3E}">
-        <p14:creationId xmlns:p14="http://schemas.microsoft.com/office/powerpoint/2010/main" val="633870546"/>
+        <p14:creationId xmlns:p14="http://schemas.microsoft.com/office/powerpoint/2010/main" val="4077081464"/>
       </p:ext>
     </p:extLst>
   </p:cSld>
@@ -2046,7 +2046,7 @@
           <p:cNvPr id="2" name="Date Placeholder 1">
             <a:extLst>
               <a:ext uri="{FF2B5EF4-FFF2-40B4-BE49-F238E27FC236}">
-                <a16:creationId xmlns:a16="http://schemas.microsoft.com/office/drawing/2014/main" id="{7C0E08D9-FBB7-41CD-BEF0-51255C3DC062}"/>
+                <a16:creationId xmlns:a16="http://schemas.microsoft.com/office/drawing/2014/main" id="{D1C0C08F-3332-46FB-865C-9EB2BC7CE6BA}"/>
               </a:ext>
             </a:extLst>
           </p:cNvPr>
@@ -2062,7 +2062,7 @@
           <a:bodyPr/>
           <a:lstStyle/>
           <a:p>
-            <a:fld id="{5E10563E-C2ED-45D1-B4AA-6A5E3DB10422}" type="datetimeFigureOut">
+            <a:fld id="{66BC6B83-723B-4A61-AF1D-11895469D1B2}" type="datetimeFigureOut">
               <a:rPr lang="en-US" smtClean="0"/>
               <a:t>3/18/2024</a:t>
             </a:fld>
@@ -2075,7 +2075,7 @@
           <p:cNvPr id="3" name="Footer Placeholder 2">
             <a:extLst>
               <a:ext uri="{FF2B5EF4-FFF2-40B4-BE49-F238E27FC236}">
-                <a16:creationId xmlns:a16="http://schemas.microsoft.com/office/drawing/2014/main" id="{BA8C4E6D-F571-48E1-8350-CCA0D90FDB5F}"/>
+                <a16:creationId xmlns:a16="http://schemas.microsoft.com/office/drawing/2014/main" id="{9DD0095D-13A0-4C81-97C6-5070AB1D0BE3}"/>
               </a:ext>
             </a:extLst>
           </p:cNvPr>
@@ -2100,7 +2100,7 @@
           <p:cNvPr id="4" name="Slide Number Placeholder 3">
             <a:extLst>
               <a:ext uri="{FF2B5EF4-FFF2-40B4-BE49-F238E27FC236}">
-                <a16:creationId xmlns:a16="http://schemas.microsoft.com/office/drawing/2014/main" id="{34153FC4-191B-413A-AD8C-546443613042}"/>
+                <a16:creationId xmlns:a16="http://schemas.microsoft.com/office/drawing/2014/main" id="{B1891827-3A36-4902-B1A6-07CD521EB5FF}"/>
               </a:ext>
             </a:extLst>
           </p:cNvPr>
@@ -2116,7 +2116,7 @@
           <a:bodyPr/>
           <a:lstStyle/>
           <a:p>
-            <a:fld id="{05F5F179-9695-4E37-BCBA-CCE21A878295}" type="slidenum">
+            <a:fld id="{F00C4CE6-1F53-4811-AB78-9A3AAF53B9BE}" type="slidenum">
               <a:rPr lang="en-US" smtClean="0"/>
               <a:t>‹#›</a:t>
             </a:fld>
@@ -2127,7 +2127,7 @@
     </p:spTree>
     <p:extLst>
       <p:ext uri="{BB962C8B-B14F-4D97-AF65-F5344CB8AC3E}">
-        <p14:creationId xmlns:p14="http://schemas.microsoft.com/office/powerpoint/2010/main" val="4092028716"/>
+        <p14:creationId xmlns:p14="http://schemas.microsoft.com/office/powerpoint/2010/main" val="1153971077"/>
       </p:ext>
     </p:extLst>
   </p:cSld>
@@ -2159,7 +2159,7 @@
           <p:cNvPr id="2" name="Title 1">
             <a:extLst>
               <a:ext uri="{FF2B5EF4-FFF2-40B4-BE49-F238E27FC236}">
-                <a16:creationId xmlns:a16="http://schemas.microsoft.com/office/drawing/2014/main" id="{F1B52149-7318-47BD-952C-408D27C4A377}"/>
+                <a16:creationId xmlns:a16="http://schemas.microsoft.com/office/drawing/2014/main" id="{44420D3A-FA9D-413D-AA03-E20077C6E985}"/>
               </a:ext>
             </a:extLst>
           </p:cNvPr>
@@ -2196,7 +2196,7 @@
           <p:cNvPr id="3" name="Content Placeholder 2">
             <a:extLst>
               <a:ext uri="{FF2B5EF4-FFF2-40B4-BE49-F238E27FC236}">
-                <a16:creationId xmlns:a16="http://schemas.microsoft.com/office/drawing/2014/main" id="{FC20033A-8CD6-459A-8730-72F16752E325}"/>
+                <a16:creationId xmlns:a16="http://schemas.microsoft.com/office/drawing/2014/main" id="{ACAD8ACD-2A90-445D-AC40-C1BACD6EC817}"/>
               </a:ext>
             </a:extLst>
           </p:cNvPr>
@@ -2286,7 +2286,7 @@
           <p:cNvPr id="4" name="Text Placeholder 3">
             <a:extLst>
               <a:ext uri="{FF2B5EF4-FFF2-40B4-BE49-F238E27FC236}">
-                <a16:creationId xmlns:a16="http://schemas.microsoft.com/office/drawing/2014/main" id="{F49E5127-437D-422E-BC2A-0A09273D1CEE}"/>
+                <a16:creationId xmlns:a16="http://schemas.microsoft.com/office/drawing/2014/main" id="{DBA11A27-D491-4A05-9985-CABEA1EEBD13}"/>
               </a:ext>
             </a:extLst>
           </p:cNvPr>
@@ -2357,7 +2357,7 @@
           <p:cNvPr id="5" name="Date Placeholder 4">
             <a:extLst>
               <a:ext uri="{FF2B5EF4-FFF2-40B4-BE49-F238E27FC236}">
-                <a16:creationId xmlns:a16="http://schemas.microsoft.com/office/drawing/2014/main" id="{68C5CDE0-CE30-4515-9DFC-D7AFAD571EF6}"/>
+                <a16:creationId xmlns:a16="http://schemas.microsoft.com/office/drawing/2014/main" id="{CACA2F2B-7B50-4ACB-9CA5-C6EBA5ED0C72}"/>
               </a:ext>
             </a:extLst>
           </p:cNvPr>
@@ -2373,7 +2373,7 @@
           <a:bodyPr/>
           <a:lstStyle/>
           <a:p>
-            <a:fld id="{5E10563E-C2ED-45D1-B4AA-6A5E3DB10422}" type="datetimeFigureOut">
+            <a:fld id="{66BC6B83-723B-4A61-AF1D-11895469D1B2}" type="datetimeFigureOut">
               <a:rPr lang="en-US" smtClean="0"/>
               <a:t>3/18/2024</a:t>
             </a:fld>
@@ -2386,7 +2386,7 @@
           <p:cNvPr id="6" name="Footer Placeholder 5">
             <a:extLst>
               <a:ext uri="{FF2B5EF4-FFF2-40B4-BE49-F238E27FC236}">
-                <a16:creationId xmlns:a16="http://schemas.microsoft.com/office/drawing/2014/main" id="{994544D7-E824-4E2A-B97A-ED2FB393398F}"/>
+                <a16:creationId xmlns:a16="http://schemas.microsoft.com/office/drawing/2014/main" id="{6081F7FF-CDDC-4E78-9E7D-3A6129214548}"/>
               </a:ext>
             </a:extLst>
           </p:cNvPr>
@@ -2411,7 +2411,7 @@
           <p:cNvPr id="7" name="Slide Number Placeholder 6">
             <a:extLst>
               <a:ext uri="{FF2B5EF4-FFF2-40B4-BE49-F238E27FC236}">
-                <a16:creationId xmlns:a16="http://schemas.microsoft.com/office/drawing/2014/main" id="{4E16B43E-CCC3-4A8C-9E65-046ED66D3F16}"/>
+                <a16:creationId xmlns:a16="http://schemas.microsoft.com/office/drawing/2014/main" id="{956D950E-BB77-4FF4-B4F2-CE7C494DFFDE}"/>
               </a:ext>
             </a:extLst>
           </p:cNvPr>
@@ -2427,7 +2427,7 @@
           <a:bodyPr/>
           <a:lstStyle/>
           <a:p>
-            <a:fld id="{05F5F179-9695-4E37-BCBA-CCE21A878295}" type="slidenum">
+            <a:fld id="{F00C4CE6-1F53-4811-AB78-9A3AAF53B9BE}" type="slidenum">
               <a:rPr lang="en-US" smtClean="0"/>
               <a:t>‹#›</a:t>
             </a:fld>
@@ -2438,7 +2438,7 @@
     </p:spTree>
     <p:extLst>
       <p:ext uri="{BB962C8B-B14F-4D97-AF65-F5344CB8AC3E}">
-        <p14:creationId xmlns:p14="http://schemas.microsoft.com/office/powerpoint/2010/main" val="2853797525"/>
+        <p14:creationId xmlns:p14="http://schemas.microsoft.com/office/powerpoint/2010/main" val="1888992497"/>
       </p:ext>
     </p:extLst>
   </p:cSld>
@@ -2470,7 +2470,7 @@
           <p:cNvPr id="2" name="Title 1">
             <a:extLst>
               <a:ext uri="{FF2B5EF4-FFF2-40B4-BE49-F238E27FC236}">
-                <a16:creationId xmlns:a16="http://schemas.microsoft.com/office/drawing/2014/main" id="{251363B9-F3F3-460A-A3EF-323BCAE3D3CE}"/>
+                <a16:creationId xmlns:a16="http://schemas.microsoft.com/office/drawing/2014/main" id="{F8FF5907-3D5D-4C78-A6B3-62A51089D41D}"/>
               </a:ext>
             </a:extLst>
           </p:cNvPr>
@@ -2507,7 +2507,7 @@
           <p:cNvPr id="3" name="Picture Placeholder 2">
             <a:extLst>
               <a:ext uri="{FF2B5EF4-FFF2-40B4-BE49-F238E27FC236}">
-                <a16:creationId xmlns:a16="http://schemas.microsoft.com/office/drawing/2014/main" id="{FBD5A550-E4EC-4926-BC22-55D7BE75A71C}"/>
+                <a16:creationId xmlns:a16="http://schemas.microsoft.com/office/drawing/2014/main" id="{DE3A9970-D249-40B2-941D-68121CD84B52}"/>
               </a:ext>
             </a:extLst>
           </p:cNvPr>
@@ -2574,7 +2574,7 @@
           <p:cNvPr id="4" name="Text Placeholder 3">
             <a:extLst>
               <a:ext uri="{FF2B5EF4-FFF2-40B4-BE49-F238E27FC236}">
-                <a16:creationId xmlns:a16="http://schemas.microsoft.com/office/drawing/2014/main" id="{025B4D8C-A04F-4C85-B15A-5FFBD3F0FAA9}"/>
+                <a16:creationId xmlns:a16="http://schemas.microsoft.com/office/drawing/2014/main" id="{25CC3E8C-B979-4D90-9F4A-47ECB8A52E64}"/>
               </a:ext>
             </a:extLst>
           </p:cNvPr>
@@ -2645,7 +2645,7 @@
           <p:cNvPr id="5" name="Date Placeholder 4">
             <a:extLst>
               <a:ext uri="{FF2B5EF4-FFF2-40B4-BE49-F238E27FC236}">
-                <a16:creationId xmlns:a16="http://schemas.microsoft.com/office/drawing/2014/main" id="{A1BFB80F-6959-4EC8-919A-4EC4828DEE38}"/>
+                <a16:creationId xmlns:a16="http://schemas.microsoft.com/office/drawing/2014/main" id="{0A2230CF-C3B1-4CE1-B7CC-C40904F59912}"/>
               </a:ext>
             </a:extLst>
           </p:cNvPr>
@@ -2661,7 +2661,7 @@
           <a:bodyPr/>
           <a:lstStyle/>
           <a:p>
-            <a:fld id="{5E10563E-C2ED-45D1-B4AA-6A5E3DB10422}" type="datetimeFigureOut">
+            <a:fld id="{66BC6B83-723B-4A61-AF1D-11895469D1B2}" type="datetimeFigureOut">
               <a:rPr lang="en-US" smtClean="0"/>
               <a:t>3/18/2024</a:t>
             </a:fld>
@@ -2674,7 +2674,7 @@
           <p:cNvPr id="6" name="Footer Placeholder 5">
             <a:extLst>
               <a:ext uri="{FF2B5EF4-FFF2-40B4-BE49-F238E27FC236}">
-                <a16:creationId xmlns:a16="http://schemas.microsoft.com/office/drawing/2014/main" id="{D2BCCEA0-2DE3-48C0-A709-40409ECDDB11}"/>
+                <a16:creationId xmlns:a16="http://schemas.microsoft.com/office/drawing/2014/main" id="{5912D2C6-0AB7-47E7-A6D2-6B68482D5F1B}"/>
               </a:ext>
             </a:extLst>
           </p:cNvPr>
@@ -2699,7 +2699,7 @@
           <p:cNvPr id="7" name="Slide Number Placeholder 6">
             <a:extLst>
               <a:ext uri="{FF2B5EF4-FFF2-40B4-BE49-F238E27FC236}">
-                <a16:creationId xmlns:a16="http://schemas.microsoft.com/office/drawing/2014/main" id="{4025D45F-9C62-4EC9-B3A4-D7C891526FC7}"/>
+                <a16:creationId xmlns:a16="http://schemas.microsoft.com/office/drawing/2014/main" id="{AEC555CB-23FB-4CA3-9554-C527EFEDDB56}"/>
               </a:ext>
             </a:extLst>
           </p:cNvPr>
@@ -2715,7 +2715,7 @@
           <a:bodyPr/>
           <a:lstStyle/>
           <a:p>
-            <a:fld id="{05F5F179-9695-4E37-BCBA-CCE21A878295}" type="slidenum">
+            <a:fld id="{F00C4CE6-1F53-4811-AB78-9A3AAF53B9BE}" type="slidenum">
               <a:rPr lang="en-US" smtClean="0"/>
               <a:t>‹#›</a:t>
             </a:fld>
@@ -2726,7 +2726,7 @@
     </p:spTree>
     <p:extLst>
       <p:ext uri="{BB962C8B-B14F-4D97-AF65-F5344CB8AC3E}">
-        <p14:creationId xmlns:p14="http://schemas.microsoft.com/office/powerpoint/2010/main" val="4016520581"/>
+        <p14:creationId xmlns:p14="http://schemas.microsoft.com/office/powerpoint/2010/main" val="3460969906"/>
       </p:ext>
     </p:extLst>
   </p:cSld>
@@ -2763,7 +2763,7 @@
           <p:cNvPr id="2" name="Title Placeholder 1">
             <a:extLst>
               <a:ext uri="{FF2B5EF4-FFF2-40B4-BE49-F238E27FC236}">
-                <a16:creationId xmlns:a16="http://schemas.microsoft.com/office/drawing/2014/main" id="{FECF4741-1DE5-4573-A5BE-01B0D79C52F8}"/>
+                <a16:creationId xmlns:a16="http://schemas.microsoft.com/office/drawing/2014/main" id="{14EFA3B5-4C36-4968-AD16-DE3857F24A50}"/>
               </a:ext>
             </a:extLst>
           </p:cNvPr>
@@ -2801,7 +2801,7 @@
           <p:cNvPr id="3" name="Text Placeholder 2">
             <a:extLst>
               <a:ext uri="{FF2B5EF4-FFF2-40B4-BE49-F238E27FC236}">
-                <a16:creationId xmlns:a16="http://schemas.microsoft.com/office/drawing/2014/main" id="{4C2B50EA-139B-4688-832A-221848593D97}"/>
+                <a16:creationId xmlns:a16="http://schemas.microsoft.com/office/drawing/2014/main" id="{420A5B98-3275-4807-9789-9B0C4A504D7A}"/>
               </a:ext>
             </a:extLst>
           </p:cNvPr>
@@ -2868,7 +2868,7 @@
           <p:cNvPr id="4" name="Date Placeholder 3">
             <a:extLst>
               <a:ext uri="{FF2B5EF4-FFF2-40B4-BE49-F238E27FC236}">
-                <a16:creationId xmlns:a16="http://schemas.microsoft.com/office/drawing/2014/main" id="{A3C98EF2-3AF3-4BE0-93DE-656F29A95CC7}"/>
+                <a16:creationId xmlns:a16="http://schemas.microsoft.com/office/drawing/2014/main" id="{4EAFAF5A-BAA3-45AD-80F1-27EA8B398343}"/>
               </a:ext>
             </a:extLst>
           </p:cNvPr>
@@ -2902,7 +2902,7 @@
             </a:lvl1pPr>
           </a:lstStyle>
           <a:p>
-            <a:fld id="{5E10563E-C2ED-45D1-B4AA-6A5E3DB10422}" type="datetimeFigureOut">
+            <a:fld id="{66BC6B83-723B-4A61-AF1D-11895469D1B2}" type="datetimeFigureOut">
               <a:rPr lang="en-US" smtClean="0"/>
               <a:t>3/18/2024</a:t>
             </a:fld>
@@ -2915,7 +2915,7 @@
           <p:cNvPr id="5" name="Footer Placeholder 4">
             <a:extLst>
               <a:ext uri="{FF2B5EF4-FFF2-40B4-BE49-F238E27FC236}">
-                <a16:creationId xmlns:a16="http://schemas.microsoft.com/office/drawing/2014/main" id="{20B53494-2759-4F5A-843B-6FCB5F754439}"/>
+                <a16:creationId xmlns:a16="http://schemas.microsoft.com/office/drawing/2014/main" id="{0D5CF3B2-8D49-423C-898D-A164629FFCA8}"/>
               </a:ext>
             </a:extLst>
           </p:cNvPr>
@@ -2958,7 +2958,7 @@
           <p:cNvPr id="6" name="Slide Number Placeholder 5">
             <a:extLst>
               <a:ext uri="{FF2B5EF4-FFF2-40B4-BE49-F238E27FC236}">
-                <a16:creationId xmlns:a16="http://schemas.microsoft.com/office/drawing/2014/main" id="{788DD953-BDEC-48EB-BF25-5D1925326DC3}"/>
+                <a16:creationId xmlns:a16="http://schemas.microsoft.com/office/drawing/2014/main" id="{8B17DE58-2022-40D3-BCEC-B972A7ACA191}"/>
               </a:ext>
             </a:extLst>
           </p:cNvPr>
@@ -2992,7 +2992,7 @@
             </a:lvl1pPr>
           </a:lstStyle>
           <a:p>
-            <a:fld id="{05F5F179-9695-4E37-BCBA-CCE21A878295}" type="slidenum">
+            <a:fld id="{F00C4CE6-1F53-4811-AB78-9A3AAF53B9BE}" type="slidenum">
               <a:rPr lang="en-US" smtClean="0"/>
               <a:t>‹#›</a:t>
             </a:fld>
@@ -3003,7 +3003,7 @@
     </p:spTree>
     <p:extLst>
       <p:ext uri="{BB962C8B-B14F-4D97-AF65-F5344CB8AC3E}">
-        <p14:creationId xmlns:p14="http://schemas.microsoft.com/office/powerpoint/2010/main" val="4157524265"/>
+        <p14:creationId xmlns:p14="http://schemas.microsoft.com/office/powerpoint/2010/main" val="3178118408"/>
       </p:ext>
     </p:extLst>
   </p:cSld>
@@ -3326,7 +3326,7 @@
           <p:cNvPr id="2" name="Title 1">
             <a:extLst>
               <a:ext uri="{FF2B5EF4-FFF2-40B4-BE49-F238E27FC236}">
-                <a16:creationId xmlns:a16="http://schemas.microsoft.com/office/drawing/2014/main" id="{799FB21C-2B75-48AC-BC2C-60C1C3C3DA9D}"/>
+                <a16:creationId xmlns:a16="http://schemas.microsoft.com/office/drawing/2014/main" id="{392F4CCE-31B8-4375-B6CE-6160492E24B8}"/>
               </a:ext>
             </a:extLst>
           </p:cNvPr>
@@ -3344,15 +3344,36 @@
           <a:p>
             <a:r>
               <a:rPr lang="pt-BR" dirty="0"/>
-              <a:t>Projeto Exemplo </a:t>
-            </a:r>
+              <a:t>Apresentação Exemplo GIT</a:t>
+            </a:r>
+            <a:endParaRPr lang="en-US" dirty="0"/>
+          </a:p>
+        </p:txBody>
+      </p:sp>
+      <p:sp>
+        <p:nvSpPr>
+          <p:cNvPr id="3" name="Subtitle 2">
+            <a:extLst>
+              <a:ext uri="{FF2B5EF4-FFF2-40B4-BE49-F238E27FC236}">
+                <a16:creationId xmlns:a16="http://schemas.microsoft.com/office/drawing/2014/main" id="{0B339599-58FA-42E4-BED4-4E95117E515B}"/>
+              </a:ext>
+            </a:extLst>
+          </p:cNvPr>
+          <p:cNvSpPr>
+            <a:spLocks noGrp="1"/>
+          </p:cNvSpPr>
+          <p:nvPr>
+            <p:ph type="subTitle" idx="1"/>
+          </p:nvPr>
+        </p:nvSpPr>
+        <p:spPr/>
+        <p:txBody>
+          <a:bodyPr/>
+          <a:lstStyle/>
+          <a:p>
             <a:r>
               <a:rPr lang="pt-BR" dirty="0" err="1"/>
-              <a:t>Git</a:t>
-            </a:r>
-            <a:r>
-              <a:rPr lang="pt-BR" dirty="0"/>
-              <a:t>!</a:t>
+              <a:t>KickOFF</a:t>
             </a:r>
             <a:endParaRPr lang="en-US" dirty="0"/>
           </a:p>
@@ -3360,41 +3381,54 @@
       </p:sp>
       <p:sp>
         <p:nvSpPr>
-          <p:cNvPr id="3" name="Subtitle 2">
-            <a:extLst>
-              <a:ext uri="{FF2B5EF4-FFF2-40B4-BE49-F238E27FC236}">
-                <a16:creationId xmlns:a16="http://schemas.microsoft.com/office/drawing/2014/main" id="{BE39CE5B-20E2-4F7D-9CC3-0EECDFF8FACE}"/>
-              </a:ext>
-            </a:extLst>
-          </p:cNvPr>
-          <p:cNvSpPr>
-            <a:spLocks noGrp="1"/>
-          </p:cNvSpPr>
-          <p:nvPr>
-            <p:ph type="subTitle" idx="1"/>
-          </p:nvPr>
-        </p:nvSpPr>
-        <p:spPr/>
-        <p:txBody>
-          <a:bodyPr/>
-          <a:lstStyle/>
-          <a:p>
-            <a:r>
-              <a:rPr lang="pt-BR" dirty="0" err="1"/>
-              <a:t>KickOff</a:t>
-            </a:r>
-            <a:r>
-              <a:rPr lang="pt-BR" dirty="0"/>
-              <a:t> :)</a:t>
-            </a:r>
-            <a:endParaRPr lang="en-US" dirty="0"/>
+          <p:cNvPr id="4" name="Oval 3">
+            <a:extLst>
+              <a:ext uri="{FF2B5EF4-FFF2-40B4-BE49-F238E27FC236}">
+                <a16:creationId xmlns:a16="http://schemas.microsoft.com/office/drawing/2014/main" id="{C076971E-5B6C-40C7-B9BF-A74947F4B999}"/>
+              </a:ext>
+            </a:extLst>
+          </p:cNvPr>
+          <p:cNvSpPr/>
+          <p:nvPr/>
+        </p:nvSpPr>
+        <p:spPr>
+          <a:xfrm>
+            <a:off x="8176591" y="4492487"/>
+            <a:ext cx="2491409" cy="2080591"/>
+          </a:xfrm>
+          <a:prstGeom prst="ellipse">
+            <a:avLst/>
+          </a:prstGeom>
+        </p:spPr>
+        <p:style>
+          <a:lnRef idx="2">
+            <a:schemeClr val="accent1">
+              <a:shade val="50000"/>
+            </a:schemeClr>
+          </a:lnRef>
+          <a:fillRef idx="1">
+            <a:schemeClr val="accent1"/>
+          </a:fillRef>
+          <a:effectRef idx="0">
+            <a:schemeClr val="accent1"/>
+          </a:effectRef>
+          <a:fontRef idx="minor">
+            <a:schemeClr val="lt1"/>
+          </a:fontRef>
+        </p:style>
+        <p:txBody>
+          <a:bodyPr rtlCol="0" anchor="ctr"/>
+          <a:lstStyle/>
+          <a:p>
+            <a:pPr algn="ctr"/>
+            <a:endParaRPr lang="en-US"/>
           </a:p>
         </p:txBody>
       </p:sp>
     </p:spTree>
     <p:extLst>
       <p:ext uri="{BB962C8B-B14F-4D97-AF65-F5344CB8AC3E}">
-        <p14:creationId xmlns:p14="http://schemas.microsoft.com/office/powerpoint/2010/main" val="910209860"/>
+        <p14:creationId xmlns:p14="http://schemas.microsoft.com/office/powerpoint/2010/main" val="1372968201"/>
       </p:ext>
     </p:extLst>
   </p:cSld>

</xml_diff>